<commit_message>
Updated presentations and report
</commit_message>
<xml_diff>
--- a/BreastCancerClassification.pptx
+++ b/BreastCancerClassification.pptx
@@ -12140,6 +12140,37 @@
                 <a:cs typeface="Times New Roman" panose="02020603050405020304" pitchFamily="18" charset="0"/>
               </a:rPr>
               <a:t>Only 1 of 63 Malignant cases were predicted as Benign</a:t>
+            </a:r>
+          </a:p>
+          <a:p>
+            <a:pPr lvl="1"/>
+            <a:endParaRPr lang="en-US" sz="1800" dirty="0">
+              <a:latin typeface="Calibri" panose="020F0502020204030204" pitchFamily="34" charset="0"/>
+              <a:cs typeface="Times New Roman" panose="02020603050405020304" pitchFamily="18" charset="0"/>
+            </a:endParaRPr>
+          </a:p>
+          <a:p>
+            <a:pPr lvl="1"/>
+            <a:endParaRPr lang="en-US" sz="1800" dirty="0">
+              <a:latin typeface="Calibri" panose="020F0502020204030204" pitchFamily="34" charset="0"/>
+              <a:cs typeface="Times New Roman" panose="02020603050405020304" pitchFamily="18" charset="0"/>
+            </a:endParaRPr>
+          </a:p>
+          <a:p>
+            <a:pPr marL="0" indent="0">
+              <a:buNone/>
+            </a:pPr>
+            <a:r>
+              <a:rPr lang="en-US" sz="1800" u="sng" dirty="0">
+                <a:solidFill>
+                  <a:srgbClr val="000000"/>
+                </a:solidFill>
+                <a:effectLst/>
+                <a:latin typeface="Calibri" panose="020F0502020204030204" pitchFamily="34" charset="0"/>
+                <a:ea typeface="Calibri" panose="020F0502020204030204" pitchFamily="34" charset="0"/>
+                <a:hlinkClick r:id="rId3"/>
+              </a:rPr>
+              <a:t>https://github.com/omatveyuk/ibm_advanced_ds</a:t>
             </a:r>
             <a:endParaRPr lang="en-US" dirty="0"/>
           </a:p>

</xml_diff>